<commit_message>
ppt done lecture1 largely
</commit_message>
<xml_diff>
--- a/slides/intro.pptx
+++ b/slides/intro.pptx
@@ -5,7 +5,7 @@
     <p:sldMasterId id="2147484003" r:id="rId1"/>
   </p:sldMasterIdLst>
   <p:notesMasterIdLst>
-    <p:notesMasterId r:id="rId29"/>
+    <p:notesMasterId r:id="rId34"/>
   </p:notesMasterIdLst>
   <p:sldIdLst>
     <p:sldId id="256" r:id="rId2"/>
@@ -33,8 +33,13 @@
     <p:sldId id="268" r:id="rId24"/>
     <p:sldId id="262" r:id="rId25"/>
     <p:sldId id="272" r:id="rId26"/>
-    <p:sldId id="269" r:id="rId27"/>
-    <p:sldId id="270" r:id="rId28"/>
+    <p:sldId id="290" r:id="rId27"/>
+    <p:sldId id="291" r:id="rId28"/>
+    <p:sldId id="292" r:id="rId29"/>
+    <p:sldId id="293" r:id="rId30"/>
+    <p:sldId id="295" r:id="rId31"/>
+    <p:sldId id="294" r:id="rId32"/>
+    <p:sldId id="296" r:id="rId33"/>
   </p:sldIdLst>
   <p:sldSz cx="12192000" cy="6858000"/>
   <p:notesSz cx="6858000" cy="9144000"/>
@@ -566,6 +571,198 @@
     <p:extLst>
       <p:ext uri="{BB962C8B-B14F-4D97-AF65-F5344CB8AC3E}">
         <p14:creationId xmlns:p14="http://schemas.microsoft.com/office/powerpoint/2010/main" val="96538514"/>
+      </p:ext>
+    </p:extLst>
+  </p:cSld>
+  <p:clrMapOvr>
+    <a:masterClrMapping/>
+  </p:clrMapOvr>
+</p:notes>
+</file>
+
+<file path=ppt/notesSlides/notesSlide2.xml><?xml version="1.0" encoding="utf-8"?>
+<p:notes xmlns:a="http://schemas.openxmlformats.org/drawingml/2006/main" xmlns:r="http://schemas.openxmlformats.org/officeDocument/2006/relationships" xmlns:p="http://schemas.openxmlformats.org/presentationml/2006/main">
+  <p:cSld>
+    <p:spTree>
+      <p:nvGrpSpPr>
+        <p:cNvPr id="1" name=""/>
+        <p:cNvGrpSpPr/>
+        <p:nvPr/>
+      </p:nvGrpSpPr>
+      <p:grpSpPr>
+        <a:xfrm>
+          <a:off x="0" y="0"/>
+          <a:ext cx="0" cy="0"/>
+          <a:chOff x="0" y="0"/>
+          <a:chExt cx="0" cy="0"/>
+        </a:xfrm>
+      </p:grpSpPr>
+      <p:sp>
+        <p:nvSpPr>
+          <p:cNvPr id="2" name="Slide Image Placeholder 1"/>
+          <p:cNvSpPr>
+            <a:spLocks noGrp="1" noRot="1" noChangeAspect="1"/>
+          </p:cNvSpPr>
+          <p:nvPr>
+            <p:ph type="sldImg"/>
+          </p:nvPr>
+        </p:nvSpPr>
+        <p:spPr/>
+      </p:sp>
+      <p:sp>
+        <p:nvSpPr>
+          <p:cNvPr id="3" name="Notes Placeholder 2"/>
+          <p:cNvSpPr>
+            <a:spLocks noGrp="1"/>
+          </p:cNvSpPr>
+          <p:nvPr>
+            <p:ph type="body" idx="1"/>
+          </p:nvPr>
+        </p:nvSpPr>
+        <p:spPr/>
+        <p:txBody>
+          <a:bodyPr/>
+          <a:lstStyle/>
+          <a:p>
+            <a:r>
+              <a:rPr lang="en-US" dirty="0" smtClean="0"/>
+              <a:t>Mean vs median,</a:t>
+            </a:r>
+            <a:r>
+              <a:rPr lang="en-US" baseline="0" dirty="0" smtClean="0"/>
+              <a:t> symmetric or </a:t>
+            </a:r>
+            <a:r>
+              <a:rPr lang="en-US" baseline="0" dirty="0" err="1" smtClean="0"/>
+              <a:t>asym</a:t>
+            </a:r>
+            <a:r>
+              <a:rPr lang="en-US" baseline="0" dirty="0" smtClean="0"/>
+              <a:t>, is it unimodal?</a:t>
+            </a:r>
+            <a:endParaRPr lang="en-US" dirty="0"/>
+          </a:p>
+        </p:txBody>
+      </p:sp>
+      <p:sp>
+        <p:nvSpPr>
+          <p:cNvPr id="4" name="Slide Number Placeholder 3"/>
+          <p:cNvSpPr>
+            <a:spLocks noGrp="1"/>
+          </p:cNvSpPr>
+          <p:nvPr>
+            <p:ph type="sldNum" sz="quarter" idx="10"/>
+          </p:nvPr>
+        </p:nvSpPr>
+        <p:spPr/>
+        <p:txBody>
+          <a:bodyPr/>
+          <a:lstStyle/>
+          <a:p>
+            <a:fld id="{E32609A5-9C0D-AB4F-B692-674CF9666E27}" type="slidenum">
+              <a:rPr lang="en-US" smtClean="0"/>
+              <a:t>27</a:t>
+            </a:fld>
+            <a:endParaRPr lang="en-US"/>
+          </a:p>
+        </p:txBody>
+      </p:sp>
+    </p:spTree>
+    <p:extLst>
+      <p:ext uri="{BB962C8B-B14F-4D97-AF65-F5344CB8AC3E}">
+        <p14:creationId xmlns:p14="http://schemas.microsoft.com/office/powerpoint/2010/main" val="1533743277"/>
+      </p:ext>
+    </p:extLst>
+  </p:cSld>
+  <p:clrMapOvr>
+    <a:masterClrMapping/>
+  </p:clrMapOvr>
+</p:notes>
+</file>
+
+<file path=ppt/notesSlides/notesSlide3.xml><?xml version="1.0" encoding="utf-8"?>
+<p:notes xmlns:a="http://schemas.openxmlformats.org/drawingml/2006/main" xmlns:r="http://schemas.openxmlformats.org/officeDocument/2006/relationships" xmlns:p="http://schemas.openxmlformats.org/presentationml/2006/main">
+  <p:cSld>
+    <p:spTree>
+      <p:nvGrpSpPr>
+        <p:cNvPr id="1" name=""/>
+        <p:cNvGrpSpPr/>
+        <p:nvPr/>
+      </p:nvGrpSpPr>
+      <p:grpSpPr>
+        <a:xfrm>
+          <a:off x="0" y="0"/>
+          <a:ext cx="0" cy="0"/>
+          <a:chOff x="0" y="0"/>
+          <a:chExt cx="0" cy="0"/>
+        </a:xfrm>
+      </p:grpSpPr>
+      <p:sp>
+        <p:nvSpPr>
+          <p:cNvPr id="2" name="Slide Image Placeholder 1"/>
+          <p:cNvSpPr>
+            <a:spLocks noGrp="1" noRot="1" noChangeAspect="1"/>
+          </p:cNvSpPr>
+          <p:nvPr>
+            <p:ph type="sldImg"/>
+          </p:nvPr>
+        </p:nvSpPr>
+        <p:spPr/>
+      </p:sp>
+      <p:sp>
+        <p:nvSpPr>
+          <p:cNvPr id="3" name="Notes Placeholder 2"/>
+          <p:cNvSpPr>
+            <a:spLocks noGrp="1"/>
+          </p:cNvSpPr>
+          <p:nvPr>
+            <p:ph type="body" idx="1"/>
+          </p:nvPr>
+        </p:nvSpPr>
+        <p:spPr/>
+        <p:txBody>
+          <a:bodyPr/>
+          <a:lstStyle/>
+          <a:p>
+            <a:r>
+              <a:rPr lang="en-US" dirty="0" smtClean="0"/>
+              <a:t>So why are there outliers</a:t>
+            </a:r>
+            <a:r>
+              <a:rPr lang="en-US" baseline="0" dirty="0" smtClean="0"/>
+              <a:t> in one and not the other?</a:t>
+            </a:r>
+            <a:endParaRPr lang="en-US" dirty="0"/>
+          </a:p>
+        </p:txBody>
+      </p:sp>
+      <p:sp>
+        <p:nvSpPr>
+          <p:cNvPr id="4" name="Slide Number Placeholder 3"/>
+          <p:cNvSpPr>
+            <a:spLocks noGrp="1"/>
+          </p:cNvSpPr>
+          <p:nvPr>
+            <p:ph type="sldNum" sz="quarter" idx="10"/>
+          </p:nvPr>
+        </p:nvSpPr>
+        <p:spPr/>
+        <p:txBody>
+          <a:bodyPr/>
+          <a:lstStyle/>
+          <a:p>
+            <a:fld id="{E32609A5-9C0D-AB4F-B692-674CF9666E27}" type="slidenum">
+              <a:rPr lang="en-US" smtClean="0"/>
+              <a:t>28</a:t>
+            </a:fld>
+            <a:endParaRPr lang="en-US"/>
+          </a:p>
+        </p:txBody>
+      </p:sp>
+    </p:spTree>
+    <p:extLst>
+      <p:ext uri="{BB962C8B-B14F-4D97-AF65-F5344CB8AC3E}">
+        <p14:creationId xmlns:p14="http://schemas.microsoft.com/office/powerpoint/2010/main" val="1540878455"/>
       </p:ext>
     </p:extLst>
   </p:cSld>
@@ -4753,7 +4950,6 @@
               <a:rPr lang="en-US" dirty="0" smtClean="0"/>
               <a:t>Discrete (includes count data)</a:t>
             </a:r>
-            <a:endParaRPr lang="en-US" dirty="0" smtClean="0"/>
           </a:p>
           <a:p>
             <a:pPr marL="11112" indent="0">
@@ -4785,11 +4981,7 @@
             </a:pPr>
             <a:r>
               <a:rPr lang="en-US" b="1" dirty="0" smtClean="0"/>
-              <a:t>Categorical </a:t>
-            </a:r>
-            <a:r>
-              <a:rPr lang="en-US" b="1" dirty="0" smtClean="0"/>
-              <a:t>data</a:t>
+              <a:t>Categorical data</a:t>
             </a:r>
           </a:p>
           <a:p>
@@ -5304,8 +5496,8 @@
           </a:p>
         </p:txBody>
       </p:sp>
-      <mc:AlternateContent xmlns:mc="http://schemas.openxmlformats.org/markup-compatibility/2006">
-        <mc:Choice xmlns:a14="http://schemas.microsoft.com/office/drawing/2010/main" Requires="a14">
+      <mc:AlternateContent xmlns:mc="http://schemas.openxmlformats.org/markup-compatibility/2006" xmlns:a14="http://schemas.microsoft.com/office/drawing/2010/main">
+        <mc:Choice Requires="a14">
           <p:sp>
             <p:nvSpPr>
               <p:cNvPr id="3" name="Content Placeholder 2"/>
@@ -5774,7 +5966,7 @@
             </p:txBody>
           </p:sp>
         </mc:Choice>
-        <mc:Fallback>
+        <mc:Fallback xmlns="">
           <p:sp>
             <p:nvSpPr>
               <p:cNvPr id="3" name="Content Placeholder 2"/>
@@ -6010,14 +6202,12 @@
               <a:rPr lang="en-US" dirty="0" smtClean="0"/>
               <a:t>Standard deviation and variance</a:t>
             </a:r>
-            <a:endParaRPr lang="en-US" dirty="0" smtClean="0"/>
           </a:p>
           <a:p>
             <a:r>
               <a:rPr lang="en-US" dirty="0" smtClean="0"/>
               <a:t>Interquartile range</a:t>
             </a:r>
-            <a:endParaRPr lang="en-US" dirty="0" smtClean="0"/>
           </a:p>
           <a:p>
             <a:endParaRPr lang="en-US" dirty="0"/>
@@ -6317,8 +6507,8 @@
           </a:p>
         </p:txBody>
       </p:sp>
-      <mc:AlternateContent xmlns:mc="http://schemas.openxmlformats.org/markup-compatibility/2006">
-        <mc:Choice xmlns:a14="http://schemas.microsoft.com/office/drawing/2010/main" Requires="a14">
+      <mc:AlternateContent xmlns:mc="http://schemas.openxmlformats.org/markup-compatibility/2006" xmlns:a14="http://schemas.microsoft.com/office/drawing/2010/main">
+        <mc:Choice Requires="a14">
           <p:sp>
             <p:nvSpPr>
               <p:cNvPr id="3" name="Content Placeholder 2"/>
@@ -6883,7 +7073,7 @@
             </p:txBody>
           </p:sp>
         </mc:Choice>
-        <mc:Fallback>
+        <mc:Fallback xmlns="">
           <p:sp>
             <p:nvSpPr>
               <p:cNvPr id="3" name="Content Placeholder 2"/>
@@ -7440,8 +7630,8 @@
           </a:p>
         </p:txBody>
       </p:sp>
-      <mc:AlternateContent xmlns:mc="http://schemas.openxmlformats.org/markup-compatibility/2006">
-        <mc:Choice xmlns:a14="http://schemas.microsoft.com/office/drawing/2010/main" Requires="a14">
+      <mc:AlternateContent xmlns:mc="http://schemas.openxmlformats.org/markup-compatibility/2006" xmlns:a14="http://schemas.microsoft.com/office/drawing/2010/main">
+        <mc:Choice Requires="a14">
           <p:sp>
             <p:nvSpPr>
               <p:cNvPr id="3" name="Content Placeholder 2"/>
@@ -7575,7 +7765,7 @@
             </p:txBody>
           </p:sp>
         </mc:Choice>
-        <mc:Fallback>
+        <mc:Fallback xmlns="">
           <p:sp>
             <p:nvSpPr>
               <p:cNvPr id="3" name="Content Placeholder 2"/>
@@ -8065,6 +8255,10 @@
           <a:bodyPr/>
           <a:lstStyle/>
           <a:p>
+            <a:r>
+              <a:rPr lang="en-US" dirty="0" smtClean="0"/>
+              <a:t>Histogram</a:t>
+            </a:r>
             <a:endParaRPr lang="en-US" dirty="0"/>
           </a:p>
         </p:txBody>
@@ -8084,69 +8278,46 @@
           <a:bodyPr/>
           <a:lstStyle/>
           <a:p>
-            <a:r>
-              <a:rPr lang="en-US" dirty="0" smtClean="0"/>
-              <a:t>Histogram and boxplot and </a:t>
-            </a:r>
-            <a:r>
-              <a:rPr lang="en-US" dirty="0" err="1" smtClean="0"/>
-              <a:t>barplot</a:t>
-            </a:r>
             <a:endParaRPr lang="en-US" dirty="0" smtClean="0"/>
           </a:p>
           <a:p>
-            <a:r>
-              <a:rPr lang="en-US" dirty="0" smtClean="0"/>
-              <a:t>Discuss back and forth </a:t>
-            </a:r>
-            <a:r>
-              <a:rPr lang="en-US" dirty="0" err="1" smtClean="0"/>
-              <a:t>hist</a:t>
-            </a:r>
-            <a:r>
-              <a:rPr lang="en-US" dirty="0" smtClean="0"/>
-              <a:t> and box</a:t>
-            </a:r>
-          </a:p>
-          <a:p>
-            <a:r>
-              <a:rPr lang="en-US" dirty="0" err="1" smtClean="0"/>
-              <a:t>Barplot</a:t>
-            </a:r>
             <a:endParaRPr lang="en-US" dirty="0" smtClean="0"/>
           </a:p>
           <a:p>
-            <a:pPr lvl="1"/>
-            <a:r>
-              <a:rPr lang="en-US" dirty="0" smtClean="0"/>
-              <a:t>Why </a:t>
-            </a:r>
-            <a:r>
-              <a:rPr lang="en-US" dirty="0" err="1" smtClean="0"/>
-              <a:t>barplots</a:t>
-            </a:r>
-            <a:r>
-              <a:rPr lang="en-US" dirty="0" smtClean="0"/>
-              <a:t> should not be used for numeric data</a:t>
-            </a:r>
-          </a:p>
-          <a:p>
-            <a:r>
-              <a:rPr lang="en-US" dirty="0" smtClean="0"/>
-              <a:t>Line plot</a:t>
-            </a:r>
-          </a:p>
-          <a:p>
-            <a:endParaRPr lang="en-US" dirty="0" smtClean="0"/>
-          </a:p>
-          <a:p>
-            <a:endParaRPr lang="en-US" dirty="0" smtClean="0"/>
-          </a:p>
-          <a:p>
-            <a:endParaRPr lang="en-US" dirty="0"/>
-          </a:p>
-        </p:txBody>
-      </p:sp>
+            <a:endParaRPr lang="en-US" dirty="0"/>
+          </a:p>
+        </p:txBody>
+      </p:sp>
+      <p:pic>
+        <p:nvPicPr>
+          <p:cNvPr id="4" name="Picture 3"/>
+          <p:cNvPicPr>
+            <a:picLocks noChangeAspect="1"/>
+          </p:cNvPicPr>
+          <p:nvPr/>
+        </p:nvPicPr>
+        <p:blipFill>
+          <a:blip r:embed="rId2">
+            <a:extLst>
+              <a:ext uri="{28A0092B-C50C-407E-A947-70E740481C1C}">
+                <a14:useLocalDpi xmlns:a14="http://schemas.microsoft.com/office/drawing/2010/main" val="0"/>
+              </a:ext>
+            </a:extLst>
+          </a:blip>
+          <a:stretch>
+            <a:fillRect/>
+          </a:stretch>
+        </p:blipFill>
+        <p:spPr>
+          <a:xfrm>
+            <a:off x="3755136" y="2230892"/>
+            <a:ext cx="4070604" cy="3746576"/>
+          </a:xfrm>
+          <a:prstGeom prst="rect">
+            <a:avLst/>
+          </a:prstGeom>
+        </p:spPr>
+      </p:pic>
     </p:spTree>
     <p:extLst>
       <p:ext uri="{BB962C8B-B14F-4D97-AF65-F5344CB8AC3E}">
@@ -8194,7 +8365,7 @@
           <a:p>
             <a:r>
               <a:rPr lang="en-US" dirty="0" smtClean="0"/>
-              <a:t>Types of variables</a:t>
+              <a:t>Boxplot</a:t>
             </a:r>
             <a:endParaRPr lang="en-US" dirty="0"/>
           </a:p>
@@ -8210,9 +8381,219 @@
             <p:ph idx="1"/>
           </p:nvPr>
         </p:nvSpPr>
-        <p:spPr/>
+        <p:spPr>
+          <a:xfrm>
+            <a:off x="1097280" y="1845734"/>
+            <a:ext cx="4361824" cy="4023360"/>
+          </a:xfrm>
+        </p:spPr>
         <p:txBody>
           <a:bodyPr/>
+          <a:lstStyle/>
+          <a:p>
+            <a:r>
+              <a:rPr lang="en-US" dirty="0"/>
+              <a:t>Graphical representation of a five-number </a:t>
+            </a:r>
+            <a:r>
+              <a:rPr lang="en-US" dirty="0" smtClean="0"/>
+              <a:t>summary</a:t>
+            </a:r>
+            <a:endParaRPr lang="en-US" dirty="0"/>
+          </a:p>
+          <a:p>
+            <a:endParaRPr lang="en-US" dirty="0"/>
+          </a:p>
+          <a:p>
+            <a:r>
+              <a:rPr lang="en-US" dirty="0"/>
+              <a:t>“Whiskers” calculated as data within +/- 1.5 IQR</a:t>
+            </a:r>
+          </a:p>
+          <a:p>
+            <a:endParaRPr lang="en-US" dirty="0"/>
+          </a:p>
+        </p:txBody>
+      </p:sp>
+      <p:pic>
+        <p:nvPicPr>
+          <p:cNvPr id="4" name="Content Placeholder 17"/>
+          <p:cNvPicPr>
+            <a:picLocks noChangeAspect="1"/>
+          </p:cNvPicPr>
+          <p:nvPr/>
+        </p:nvPicPr>
+        <p:blipFill>
+          <a:blip r:embed="rId2">
+            <a:extLst>
+              <a:ext uri="{28A0092B-C50C-407E-A947-70E740481C1C}">
+                <a14:useLocalDpi xmlns:a14="http://schemas.microsoft.com/office/drawing/2010/main" val="0"/>
+              </a:ext>
+            </a:extLst>
+          </a:blip>
+          <a:stretch>
+            <a:fillRect/>
+          </a:stretch>
+        </p:blipFill>
+        <p:spPr>
+          <a:xfrm>
+            <a:off x="5948317" y="1985346"/>
+            <a:ext cx="4724232" cy="4466781"/>
+          </a:xfrm>
+          <a:prstGeom prst="rect">
+            <a:avLst/>
+          </a:prstGeom>
+        </p:spPr>
+      </p:pic>
+      <p:sp>
+        <p:nvSpPr>
+          <p:cNvPr id="5" name="Right Brace 4"/>
+          <p:cNvSpPr/>
+          <p:nvPr/>
+        </p:nvSpPr>
+        <p:spPr>
+          <a:xfrm>
+            <a:off x="8468576" y="2591337"/>
+            <a:ext cx="291357" cy="760456"/>
+          </a:xfrm>
+          <a:prstGeom prst="rightBrace">
+            <a:avLst/>
+          </a:prstGeom>
+          <a:ln w="25400">
+            <a:solidFill>
+              <a:srgbClr val="FF0000"/>
+            </a:solidFill>
+          </a:ln>
+        </p:spPr>
+        <p:style>
+          <a:lnRef idx="1">
+            <a:schemeClr val="accent1"/>
+          </a:lnRef>
+          <a:fillRef idx="0">
+            <a:schemeClr val="accent1"/>
+          </a:fillRef>
+          <a:effectRef idx="0">
+            <a:schemeClr val="accent1"/>
+          </a:effectRef>
+          <a:fontRef idx="minor">
+            <a:schemeClr val="tx1"/>
+          </a:fontRef>
+        </p:style>
+        <p:txBody>
+          <a:bodyPr rtlCol="0" anchor="ctr"/>
+          <a:lstStyle/>
+          <a:p>
+            <a:pPr algn="ctr"/>
+            <a:endParaRPr lang="en-US"/>
+          </a:p>
+        </p:txBody>
+      </p:sp>
+      <p:sp>
+        <p:nvSpPr>
+          <p:cNvPr id="6" name="Right Brace 5"/>
+          <p:cNvSpPr/>
+          <p:nvPr/>
+        </p:nvSpPr>
+        <p:spPr>
+          <a:xfrm>
+            <a:off x="9670307" y="3342175"/>
+            <a:ext cx="283063" cy="662918"/>
+          </a:xfrm>
+          <a:prstGeom prst="rightBrace">
+            <a:avLst/>
+          </a:prstGeom>
+          <a:ln w="25400">
+            <a:solidFill>
+              <a:srgbClr val="FF0000"/>
+            </a:solidFill>
+          </a:ln>
+        </p:spPr>
+        <p:style>
+          <a:lnRef idx="1">
+            <a:schemeClr val="accent1"/>
+          </a:lnRef>
+          <a:fillRef idx="0">
+            <a:schemeClr val="accent1"/>
+          </a:fillRef>
+          <a:effectRef idx="0">
+            <a:schemeClr val="accent1"/>
+          </a:effectRef>
+          <a:fontRef idx="minor">
+            <a:schemeClr val="tx1"/>
+          </a:fontRef>
+        </p:style>
+        <p:txBody>
+          <a:bodyPr rtlCol="0" anchor="ctr"/>
+          <a:lstStyle/>
+          <a:p>
+            <a:pPr algn="ctr"/>
+            <a:endParaRPr lang="en-US"/>
+          </a:p>
+        </p:txBody>
+      </p:sp>
+      <p:sp>
+        <p:nvSpPr>
+          <p:cNvPr id="7" name="Right Brace 6"/>
+          <p:cNvSpPr/>
+          <p:nvPr/>
+        </p:nvSpPr>
+        <p:spPr>
+          <a:xfrm rot="10800000">
+            <a:off x="8075608" y="5195991"/>
+            <a:ext cx="138864" cy="176803"/>
+          </a:xfrm>
+          <a:prstGeom prst="rightBrace">
+            <a:avLst/>
+          </a:prstGeom>
+          <a:ln w="25400">
+            <a:solidFill>
+              <a:srgbClr val="FF0000"/>
+            </a:solidFill>
+          </a:ln>
+        </p:spPr>
+        <p:style>
+          <a:lnRef idx="1">
+            <a:schemeClr val="accent1"/>
+          </a:lnRef>
+          <a:fillRef idx="0">
+            <a:schemeClr val="accent1"/>
+          </a:fillRef>
+          <a:effectRef idx="0">
+            <a:schemeClr val="accent1"/>
+          </a:effectRef>
+          <a:fontRef idx="minor">
+            <a:schemeClr val="tx1"/>
+          </a:fontRef>
+        </p:style>
+        <p:txBody>
+          <a:bodyPr rtlCol="0" anchor="ctr"/>
+          <a:lstStyle/>
+          <a:p>
+            <a:pPr algn="ctr"/>
+            <a:endParaRPr lang="en-US"/>
+          </a:p>
+        </p:txBody>
+      </p:sp>
+      <p:sp>
+        <p:nvSpPr>
+          <p:cNvPr id="8" name="TextBox 7"/>
+          <p:cNvSpPr txBox="1"/>
+          <p:nvPr/>
+        </p:nvSpPr>
+        <p:spPr>
+          <a:xfrm>
+            <a:off x="8685248" y="2782089"/>
+            <a:ext cx="572281" cy="374064"/>
+          </a:xfrm>
+          <a:prstGeom prst="rect">
+            <a:avLst/>
+          </a:prstGeom>
+          <a:noFill/>
+        </p:spPr>
+        <p:txBody>
+          <a:bodyPr wrap="square" rtlCol="0">
+            <a:spAutoFit/>
+          </a:bodyPr>
           <a:lstStyle/>
           <a:p>
             <a:r>
@@ -8221,133 +8602,331 @@
                   <a:srgbClr val="FF0000"/>
                 </a:solidFill>
               </a:rPr>
-              <a:t>Response</a:t>
-            </a:r>
-            <a:r>
-              <a:rPr lang="en-US" dirty="0" smtClean="0"/>
-              <a:t> vs </a:t>
-            </a:r>
-            <a:r>
-              <a:rPr lang="en-US" dirty="0" smtClean="0">
+              <a:t>Q3</a:t>
+            </a:r>
+            <a:endParaRPr lang="en-US" dirty="0">
+              <a:solidFill>
+                <a:srgbClr val="FF0000"/>
+              </a:solidFill>
+            </a:endParaRPr>
+          </a:p>
+        </p:txBody>
+      </p:sp>
+      <p:sp>
+        <p:nvSpPr>
+          <p:cNvPr id="9" name="Right Brace 8"/>
+          <p:cNvSpPr/>
+          <p:nvPr/>
+        </p:nvSpPr>
+        <p:spPr>
+          <a:xfrm>
+            <a:off x="8422855" y="4019661"/>
+            <a:ext cx="291357" cy="760456"/>
+          </a:xfrm>
+          <a:prstGeom prst="rightBrace">
+            <a:avLst/>
+          </a:prstGeom>
+          <a:ln w="25400">
+            <a:solidFill>
+              <a:srgbClr val="FF0000"/>
+            </a:solidFill>
+          </a:ln>
+        </p:spPr>
+        <p:style>
+          <a:lnRef idx="1">
+            <a:schemeClr val="accent1"/>
+          </a:lnRef>
+          <a:fillRef idx="0">
+            <a:schemeClr val="accent1"/>
+          </a:fillRef>
+          <a:effectRef idx="0">
+            <a:schemeClr val="accent1"/>
+          </a:effectRef>
+          <a:fontRef idx="minor">
+            <a:schemeClr val="tx1"/>
+          </a:fontRef>
+        </p:style>
+        <p:txBody>
+          <a:bodyPr rtlCol="0" anchor="ctr"/>
+          <a:lstStyle/>
+          <a:p>
+            <a:pPr algn="ctr"/>
+            <a:endParaRPr lang="en-US"/>
+          </a:p>
+        </p:txBody>
+      </p:sp>
+      <p:sp>
+        <p:nvSpPr>
+          <p:cNvPr id="10" name="TextBox 9"/>
+          <p:cNvSpPr txBox="1"/>
+          <p:nvPr/>
+        </p:nvSpPr>
+        <p:spPr>
+          <a:xfrm>
+            <a:off x="7177347" y="5098609"/>
+            <a:ext cx="1061489" cy="374064"/>
+          </a:xfrm>
+          <a:prstGeom prst="rect">
+            <a:avLst/>
+          </a:prstGeom>
+          <a:noFill/>
+        </p:spPr>
+        <p:txBody>
+          <a:bodyPr wrap="square" rtlCol="0">
+            <a:spAutoFit/>
+          </a:bodyPr>
+          <a:lstStyle/>
+          <a:p>
+            <a:r>
+              <a:rPr lang="en-US" smtClean="0">
                 <a:solidFill>
-                  <a:schemeClr val="accent4">
-                    <a:lumMod val="75000"/>
-                  </a:schemeClr>
+                  <a:srgbClr val="FF0000"/>
                 </a:solidFill>
               </a:rPr>
-              <a:t>Explanatory </a:t>
-            </a:r>
-          </a:p>
-          <a:p>
-            <a:pPr lvl="1"/>
-            <a:r>
-              <a:rPr lang="en-US" dirty="0"/>
-              <a:t>T</a:t>
-            </a:r>
-            <a:r>
-              <a:rPr lang="en-US" dirty="0" smtClean="0"/>
-              <a:t>he </a:t>
-            </a:r>
+              <a:t>outliers</a:t>
+            </a:r>
+            <a:endParaRPr lang="en-US" dirty="0">
+              <a:solidFill>
+                <a:srgbClr val="FF0000"/>
+              </a:solidFill>
+            </a:endParaRPr>
+          </a:p>
+        </p:txBody>
+      </p:sp>
+      <p:sp>
+        <p:nvSpPr>
+          <p:cNvPr id="11" name="TextBox 10"/>
+          <p:cNvSpPr txBox="1"/>
+          <p:nvPr/>
+        </p:nvSpPr>
+        <p:spPr>
+          <a:xfrm>
+            <a:off x="8639527" y="4210413"/>
+            <a:ext cx="572281" cy="374064"/>
+          </a:xfrm>
+          <a:prstGeom prst="rect">
+            <a:avLst/>
+          </a:prstGeom>
+          <a:noFill/>
+        </p:spPr>
+        <p:txBody>
+          <a:bodyPr wrap="square" rtlCol="0">
+            <a:spAutoFit/>
+          </a:bodyPr>
+          <a:lstStyle/>
+          <a:p>
             <a:r>
               <a:rPr lang="en-US" dirty="0" smtClean="0">
                 <a:solidFill>
                   <a:srgbClr val="FF0000"/>
                 </a:solidFill>
               </a:rPr>
-              <a:t>response</a:t>
-            </a:r>
-            <a:r>
-              <a:rPr lang="en-US" dirty="0" smtClean="0"/>
-              <a:t> is what we’d like to predict, and the </a:t>
-            </a:r>
-            <a:r>
-              <a:rPr lang="en-US" dirty="0" smtClean="0">
-                <a:solidFill>
-                  <a:schemeClr val="accent4">
-                    <a:lumMod val="75000"/>
-                  </a:schemeClr>
-                </a:solidFill>
-              </a:rPr>
-              <a:t>explanatory</a:t>
-            </a:r>
-            <a:r>
-              <a:rPr lang="en-US" dirty="0" smtClean="0"/>
-              <a:t> is what we’re using to predict</a:t>
-            </a:r>
-          </a:p>
-          <a:p>
-            <a:pPr lvl="1"/>
-            <a:r>
-              <a:rPr lang="en-US" dirty="0" smtClean="0"/>
-              <a:t>Also known as </a:t>
-            </a:r>
-            <a:r>
-              <a:rPr lang="en-US" dirty="0" smtClean="0">
+              <a:t>Q1</a:t>
+            </a:r>
+            <a:endParaRPr lang="en-US" dirty="0">
+              <a:solidFill>
+                <a:srgbClr val="FF0000"/>
+              </a:solidFill>
+            </a:endParaRPr>
+          </a:p>
+        </p:txBody>
+      </p:sp>
+      <p:cxnSp>
+        <p:nvCxnSpPr>
+          <p:cNvPr id="12" name="Straight Arrow Connector 11"/>
+          <p:cNvCxnSpPr/>
+          <p:nvPr/>
+        </p:nvCxnSpPr>
+        <p:spPr>
+          <a:xfrm>
+            <a:off x="7217539" y="3265103"/>
+            <a:ext cx="655924" cy="393861"/>
+          </a:xfrm>
+          <a:prstGeom prst="straightConnector1">
+            <a:avLst/>
+          </a:prstGeom>
+          <a:ln w="38100">
+            <a:solidFill>
+              <a:srgbClr val="FF0000"/>
+            </a:solidFill>
+            <a:tailEnd type="triangle"/>
+          </a:ln>
+        </p:spPr>
+        <p:style>
+          <a:lnRef idx="1">
+            <a:schemeClr val="accent1"/>
+          </a:lnRef>
+          <a:fillRef idx="0">
+            <a:schemeClr val="accent1"/>
+          </a:fillRef>
+          <a:effectRef idx="0">
+            <a:schemeClr val="accent1"/>
+          </a:effectRef>
+          <a:fontRef idx="minor">
+            <a:schemeClr val="tx1"/>
+          </a:fontRef>
+        </p:style>
+      </p:cxnSp>
+      <p:sp>
+        <p:nvSpPr>
+          <p:cNvPr id="13" name="TextBox 12"/>
+          <p:cNvSpPr txBox="1"/>
+          <p:nvPr/>
+        </p:nvSpPr>
+        <p:spPr>
+          <a:xfrm>
+            <a:off x="6413199" y="3071797"/>
+            <a:ext cx="1233993" cy="374064"/>
+          </a:xfrm>
+          <a:prstGeom prst="rect">
+            <a:avLst/>
+          </a:prstGeom>
+          <a:noFill/>
+        </p:spPr>
+        <p:txBody>
+          <a:bodyPr wrap="square" rtlCol="0">
+            <a:spAutoFit/>
+          </a:bodyPr>
+          <a:lstStyle/>
+          <a:p>
+            <a:r>
+              <a:rPr lang="en-US" smtClean="0">
                 <a:solidFill>
                   <a:srgbClr val="FF0000"/>
                 </a:solidFill>
               </a:rPr>
-              <a:t>independent </a:t>
-            </a:r>
-            <a:r>
-              <a:rPr lang="en-US" dirty="0"/>
-              <a:t>and</a:t>
-            </a:r>
-            <a:r>
-              <a:rPr lang="en-US" dirty="0" smtClean="0"/>
-              <a:t> </a:t>
-            </a:r>
+              <a:t>Median</a:t>
+            </a:r>
+            <a:endParaRPr lang="en-US" dirty="0">
+              <a:solidFill>
+                <a:srgbClr val="FF0000"/>
+              </a:solidFill>
+            </a:endParaRPr>
+          </a:p>
+        </p:txBody>
+      </p:sp>
+      <p:sp>
+        <p:nvSpPr>
+          <p:cNvPr id="14" name="TextBox 13"/>
+          <p:cNvSpPr txBox="1"/>
+          <p:nvPr/>
+        </p:nvSpPr>
+        <p:spPr>
+          <a:xfrm>
+            <a:off x="6556676" y="2048329"/>
+            <a:ext cx="1467625" cy="374064"/>
+          </a:xfrm>
+          <a:prstGeom prst="rect">
+            <a:avLst/>
+          </a:prstGeom>
+          <a:noFill/>
+        </p:spPr>
+        <p:txBody>
+          <a:bodyPr wrap="square" rtlCol="0">
+            <a:spAutoFit/>
+          </a:bodyPr>
+          <a:lstStyle/>
+          <a:p>
             <a:r>
               <a:rPr lang="en-US" dirty="0" smtClean="0">
                 <a:solidFill>
-                  <a:schemeClr val="accent4">
-                    <a:lumMod val="75000"/>
+                  <a:schemeClr val="bg2">
+                    <a:lumMod val="50000"/>
                   </a:schemeClr>
                 </a:solidFill>
               </a:rPr>
-              <a:t>dependent</a:t>
-            </a:r>
-          </a:p>
-          <a:p>
-            <a:pPr lvl="1"/>
+              <a:t>“whiskers”</a:t>
+            </a:r>
             <a:endParaRPr lang="en-US" dirty="0">
               <a:solidFill>
-                <a:schemeClr val="accent4">
-                  <a:lumMod val="75000"/>
+                <a:schemeClr val="bg2">
+                  <a:lumMod val="50000"/>
                 </a:schemeClr>
               </a:solidFill>
             </a:endParaRPr>
           </a:p>
-          <a:p>
-            <a:pPr lvl="1"/>
-            <a:endParaRPr lang="en-US" dirty="0" smtClean="0">
-              <a:solidFill>
-                <a:schemeClr val="accent4">
-                  <a:lumMod val="75000"/>
-                </a:schemeClr>
-              </a:solidFill>
-            </a:endParaRPr>
-          </a:p>
-          <a:p>
-            <a:pPr lvl="1"/>
-            <a:r>
-              <a:rPr lang="en-US" dirty="0" smtClean="0">
-                <a:solidFill>
-                  <a:schemeClr val="accent4">
-                    <a:lumMod val="75000"/>
-                  </a:schemeClr>
-                </a:solidFill>
-              </a:rPr>
-              <a:t>[scatter plot]</a:t>
-            </a:r>
-            <a:endParaRPr lang="en-US" dirty="0"/>
-          </a:p>
-        </p:txBody>
-      </p:sp>
+        </p:txBody>
+      </p:sp>
+      <p:cxnSp>
+        <p:nvCxnSpPr>
+          <p:cNvPr id="15" name="Straight Arrow Connector 14"/>
+          <p:cNvCxnSpPr/>
+          <p:nvPr/>
+        </p:nvCxnSpPr>
+        <p:spPr>
+          <a:xfrm>
+            <a:off x="7265665" y="2382939"/>
+            <a:ext cx="1038215" cy="460373"/>
+          </a:xfrm>
+          <a:prstGeom prst="straightConnector1">
+            <a:avLst/>
+          </a:prstGeom>
+          <a:ln w="38100">
+            <a:solidFill>
+              <a:schemeClr val="bg2">
+                <a:lumMod val="50000"/>
+              </a:schemeClr>
+            </a:solidFill>
+            <a:tailEnd type="triangle"/>
+          </a:ln>
+        </p:spPr>
+        <p:style>
+          <a:lnRef idx="1">
+            <a:schemeClr val="accent1"/>
+          </a:lnRef>
+          <a:fillRef idx="0">
+            <a:schemeClr val="accent1"/>
+          </a:fillRef>
+          <a:effectRef idx="0">
+            <a:schemeClr val="accent1"/>
+          </a:effectRef>
+          <a:fontRef idx="minor">
+            <a:schemeClr val="tx1"/>
+          </a:fontRef>
+        </p:style>
+      </p:cxnSp>
+      <p:cxnSp>
+        <p:nvCxnSpPr>
+          <p:cNvPr id="16" name="Straight Arrow Connector 15"/>
+          <p:cNvCxnSpPr/>
+          <p:nvPr/>
+        </p:nvCxnSpPr>
+        <p:spPr>
+          <a:xfrm>
+            <a:off x="7217539" y="2417661"/>
+            <a:ext cx="1128995" cy="2002751"/>
+          </a:xfrm>
+          <a:prstGeom prst="straightConnector1">
+            <a:avLst/>
+          </a:prstGeom>
+          <a:ln w="38100">
+            <a:solidFill>
+              <a:schemeClr val="bg2">
+                <a:lumMod val="50000"/>
+              </a:schemeClr>
+            </a:solidFill>
+            <a:tailEnd type="triangle"/>
+          </a:ln>
+        </p:spPr>
+        <p:style>
+          <a:lnRef idx="1">
+            <a:schemeClr val="accent1"/>
+          </a:lnRef>
+          <a:fillRef idx="0">
+            <a:schemeClr val="accent1"/>
+          </a:fillRef>
+          <a:effectRef idx="0">
+            <a:schemeClr val="accent1"/>
+          </a:effectRef>
+          <a:fontRef idx="minor">
+            <a:schemeClr val="tx1"/>
+          </a:fontRef>
+        </p:style>
+      </p:cxnSp>
     </p:spTree>
     <p:extLst>
       <p:ext uri="{BB962C8B-B14F-4D97-AF65-F5344CB8AC3E}">
-        <p14:creationId xmlns:p14="http://schemas.microsoft.com/office/powerpoint/2010/main" val="158604534"/>
+        <p14:creationId xmlns:p14="http://schemas.microsoft.com/office/powerpoint/2010/main" val="1952281131"/>
       </p:ext>
     </p:extLst>
   </p:cSld>
@@ -8391,35 +8970,314 @@
           <a:p>
             <a:r>
               <a:rPr lang="en-US" dirty="0" smtClean="0"/>
-              <a:t>Worksheet break, then R time</a:t>
-            </a:r>
-            <a:endParaRPr lang="en-US" dirty="0"/>
-          </a:p>
-        </p:txBody>
-      </p:sp>
-      <p:sp>
-        <p:nvSpPr>
-          <p:cNvPr id="3" name="Content Placeholder 2"/>
-          <p:cNvSpPr>
-            <a:spLocks noGrp="1"/>
-          </p:cNvSpPr>
+              <a:t>What can we say about this distribution based on its boxplot?</a:t>
+            </a:r>
+            <a:endParaRPr lang="en-US" dirty="0"/>
+          </a:p>
+        </p:txBody>
+      </p:sp>
+      <p:pic>
+        <p:nvPicPr>
+          <p:cNvPr id="4" name="Content Placeholder 3"/>
+          <p:cNvPicPr>
+            <a:picLocks noGrp="1" noChangeAspect="1"/>
+          </p:cNvPicPr>
           <p:nvPr>
             <p:ph idx="1"/>
           </p:nvPr>
-        </p:nvSpPr>
-        <p:spPr/>
-        <p:txBody>
-          <a:bodyPr/>
-          <a:lstStyle/>
-          <a:p>
-            <a:endParaRPr lang="en-US" dirty="0"/>
-          </a:p>
-        </p:txBody>
-      </p:sp>
+        </p:nvPicPr>
+        <p:blipFill>
+          <a:blip r:embed="rId3">
+            <a:extLst>
+              <a:ext uri="{28A0092B-C50C-407E-A947-70E740481C1C}">
+                <a14:useLocalDpi xmlns:a14="http://schemas.microsoft.com/office/drawing/2010/main" val="0"/>
+              </a:ext>
+            </a:extLst>
+          </a:blip>
+          <a:stretch>
+            <a:fillRect/>
+          </a:stretch>
+        </p:blipFill>
+        <p:spPr>
+          <a:xfrm>
+            <a:off x="3594859" y="1737360"/>
+            <a:ext cx="5063241" cy="4787315"/>
+          </a:xfrm>
+        </p:spPr>
+      </p:pic>
     </p:spTree>
     <p:extLst>
       <p:ext uri="{BB962C8B-B14F-4D97-AF65-F5344CB8AC3E}">
-        <p14:creationId xmlns:p14="http://schemas.microsoft.com/office/powerpoint/2010/main" val="31488772"/>
+        <p14:creationId xmlns:p14="http://schemas.microsoft.com/office/powerpoint/2010/main" val="1346658810"/>
+      </p:ext>
+    </p:extLst>
+  </p:cSld>
+  <p:clrMapOvr>
+    <a:masterClrMapping/>
+  </p:clrMapOvr>
+</p:sld>
+</file>
+
+<file path=ppt/slides/slide28.xml><?xml version="1.0" encoding="utf-8"?>
+<p:sld xmlns:a="http://schemas.openxmlformats.org/drawingml/2006/main" xmlns:r="http://schemas.openxmlformats.org/officeDocument/2006/relationships" xmlns:p="http://schemas.openxmlformats.org/presentationml/2006/main">
+  <p:cSld>
+    <p:spTree>
+      <p:nvGrpSpPr>
+        <p:cNvPr id="1" name=""/>
+        <p:cNvGrpSpPr/>
+        <p:nvPr/>
+      </p:nvGrpSpPr>
+      <p:grpSpPr>
+        <a:xfrm>
+          <a:off x="0" y="0"/>
+          <a:ext cx="0" cy="0"/>
+          <a:chOff x="0" y="0"/>
+          <a:chExt cx="0" cy="0"/>
+        </a:xfrm>
+      </p:grpSpPr>
+      <p:sp>
+        <p:nvSpPr>
+          <p:cNvPr id="2" name="Title 1"/>
+          <p:cNvSpPr>
+            <a:spLocks noGrp="1"/>
+          </p:cNvSpPr>
+          <p:nvPr>
+            <p:ph type="title"/>
+          </p:nvPr>
+        </p:nvSpPr>
+        <p:spPr/>
+        <p:txBody>
+          <a:bodyPr/>
+          <a:lstStyle/>
+          <a:p>
+            <a:r>
+              <a:rPr lang="en-US" dirty="0" smtClean="0"/>
+              <a:t>Boxplots: The plot thickens*</a:t>
+            </a:r>
+            <a:endParaRPr lang="en-US" dirty="0"/>
+          </a:p>
+        </p:txBody>
+      </p:sp>
+      <p:pic>
+        <p:nvPicPr>
+          <p:cNvPr id="5" name="Content Placeholder 4"/>
+          <p:cNvPicPr>
+            <a:picLocks noGrp="1" noChangeAspect="1"/>
+          </p:cNvPicPr>
+          <p:nvPr>
+            <p:ph idx="1"/>
+          </p:nvPr>
+        </p:nvPicPr>
+        <p:blipFill>
+          <a:blip r:embed="rId3">
+            <a:extLst>
+              <a:ext uri="{28A0092B-C50C-407E-A947-70E740481C1C}">
+                <a14:useLocalDpi xmlns:a14="http://schemas.microsoft.com/office/drawing/2010/main" val="0"/>
+              </a:ext>
+            </a:extLst>
+          </a:blip>
+          <a:stretch>
+            <a:fillRect/>
+          </a:stretch>
+        </p:blipFill>
+        <p:spPr>
+          <a:xfrm>
+            <a:off x="478066" y="2078275"/>
+            <a:ext cx="4254582" cy="4022725"/>
+          </a:xfrm>
+        </p:spPr>
+      </p:pic>
+      <p:sp>
+        <p:nvSpPr>
+          <p:cNvPr id="4" name="TextBox 3"/>
+          <p:cNvSpPr txBox="1"/>
+          <p:nvPr/>
+        </p:nvSpPr>
+        <p:spPr>
+          <a:xfrm>
+            <a:off x="11155680" y="6100999"/>
+            <a:ext cx="1304726" cy="276999"/>
+          </a:xfrm>
+          <a:prstGeom prst="rect">
+            <a:avLst/>
+          </a:prstGeom>
+          <a:noFill/>
+        </p:spPr>
+        <p:txBody>
+          <a:bodyPr wrap="square" rtlCol="0">
+            <a:spAutoFit/>
+          </a:bodyPr>
+          <a:lstStyle/>
+          <a:p>
+            <a:r>
+              <a:rPr lang="en-US" sz="1200" dirty="0" smtClean="0"/>
+              <a:t>*Pun intended.</a:t>
+            </a:r>
+            <a:endParaRPr lang="en-US" sz="1200" dirty="0"/>
+          </a:p>
+        </p:txBody>
+      </p:sp>
+      <p:sp>
+        <p:nvSpPr>
+          <p:cNvPr id="7" name="Striped Right Arrow 6"/>
+          <p:cNvSpPr/>
+          <p:nvPr/>
+        </p:nvSpPr>
+        <p:spPr>
+          <a:xfrm>
+            <a:off x="4965564" y="3301848"/>
+            <a:ext cx="1310185" cy="900752"/>
+          </a:xfrm>
+          <a:prstGeom prst="stripedRightArrow">
+            <a:avLst/>
+          </a:prstGeom>
+          <a:solidFill>
+            <a:schemeClr val="tx2">
+              <a:lumMod val="75000"/>
+            </a:schemeClr>
+          </a:solidFill>
+        </p:spPr>
+        <p:style>
+          <a:lnRef idx="2">
+            <a:schemeClr val="accent1">
+              <a:shade val="50000"/>
+            </a:schemeClr>
+          </a:lnRef>
+          <a:fillRef idx="1">
+            <a:schemeClr val="accent1"/>
+          </a:fillRef>
+          <a:effectRef idx="0">
+            <a:schemeClr val="accent1"/>
+          </a:effectRef>
+          <a:fontRef idx="minor">
+            <a:schemeClr val="lt1"/>
+          </a:fontRef>
+        </p:style>
+        <p:txBody>
+          <a:bodyPr rtlCol="0" anchor="ctr"/>
+          <a:lstStyle/>
+          <a:p>
+            <a:pPr algn="ctr"/>
+            <a:endParaRPr lang="en-US"/>
+          </a:p>
+        </p:txBody>
+      </p:sp>
+      <p:pic>
+        <p:nvPicPr>
+          <p:cNvPr id="8" name="Picture 7"/>
+          <p:cNvPicPr>
+            <a:picLocks noChangeAspect="1"/>
+          </p:cNvPicPr>
+          <p:nvPr/>
+        </p:nvPicPr>
+        <p:blipFill>
+          <a:blip r:embed="rId4">
+            <a:extLst>
+              <a:ext uri="{28A0092B-C50C-407E-A947-70E740481C1C}">
+                <a14:useLocalDpi xmlns:a14="http://schemas.microsoft.com/office/drawing/2010/main" val="0"/>
+              </a:ext>
+            </a:extLst>
+          </a:blip>
+          <a:stretch>
+            <a:fillRect/>
+          </a:stretch>
+        </p:blipFill>
+        <p:spPr>
+          <a:xfrm>
+            <a:off x="6290109" y="2304202"/>
+            <a:ext cx="5794415" cy="3796797"/>
+          </a:xfrm>
+          <a:prstGeom prst="rect">
+            <a:avLst/>
+          </a:prstGeom>
+        </p:spPr>
+      </p:pic>
+    </p:spTree>
+    <p:extLst>
+      <p:ext uri="{BB962C8B-B14F-4D97-AF65-F5344CB8AC3E}">
+        <p14:creationId xmlns:p14="http://schemas.microsoft.com/office/powerpoint/2010/main" val="645854851"/>
+      </p:ext>
+    </p:extLst>
+  </p:cSld>
+  <p:clrMapOvr>
+    <a:masterClrMapping/>
+  </p:clrMapOvr>
+</p:sld>
+</file>
+
+<file path=ppt/slides/slide29.xml><?xml version="1.0" encoding="utf-8"?>
+<p:sld xmlns:a="http://schemas.openxmlformats.org/drawingml/2006/main" xmlns:r="http://schemas.openxmlformats.org/officeDocument/2006/relationships" xmlns:p="http://schemas.openxmlformats.org/presentationml/2006/main">
+  <p:cSld>
+    <p:spTree>
+      <p:nvGrpSpPr>
+        <p:cNvPr id="1" name=""/>
+        <p:cNvGrpSpPr/>
+        <p:nvPr/>
+      </p:nvGrpSpPr>
+      <p:grpSpPr>
+        <a:xfrm>
+          <a:off x="0" y="0"/>
+          <a:ext cx="0" cy="0"/>
+          <a:chOff x="0" y="0"/>
+          <a:chExt cx="0" cy="0"/>
+        </a:xfrm>
+      </p:grpSpPr>
+      <p:sp>
+        <p:nvSpPr>
+          <p:cNvPr id="2" name="Title 1"/>
+          <p:cNvSpPr>
+            <a:spLocks noGrp="1"/>
+          </p:cNvSpPr>
+          <p:nvPr>
+            <p:ph type="title"/>
+          </p:nvPr>
+        </p:nvSpPr>
+        <p:spPr/>
+        <p:txBody>
+          <a:bodyPr/>
+          <a:lstStyle/>
+          <a:p>
+            <a:r>
+              <a:rPr lang="en-US" dirty="0" err="1" smtClean="0"/>
+              <a:t>Barplot</a:t>
+            </a:r>
+            <a:endParaRPr lang="en-US" dirty="0"/>
+          </a:p>
+        </p:txBody>
+      </p:sp>
+      <p:pic>
+        <p:nvPicPr>
+          <p:cNvPr id="4" name="Content Placeholder 3"/>
+          <p:cNvPicPr>
+            <a:picLocks noGrp="1" noChangeAspect="1"/>
+          </p:cNvPicPr>
+          <p:nvPr>
+            <p:ph idx="1"/>
+          </p:nvPr>
+        </p:nvPicPr>
+        <p:blipFill>
+          <a:blip r:embed="rId2">
+            <a:extLst>
+              <a:ext uri="{28A0092B-C50C-407E-A947-70E740481C1C}">
+                <a14:useLocalDpi xmlns:a14="http://schemas.microsoft.com/office/drawing/2010/main" val="0"/>
+              </a:ext>
+            </a:extLst>
+          </a:blip>
+          <a:stretch>
+            <a:fillRect/>
+          </a:stretch>
+        </p:blipFill>
+        <p:spPr>
+          <a:xfrm>
+            <a:off x="3118821" y="1985701"/>
+            <a:ext cx="7267124" cy="4203992"/>
+          </a:xfrm>
+        </p:spPr>
+      </p:pic>
+    </p:spTree>
+    <p:extLst>
+      <p:ext uri="{BB962C8B-B14F-4D97-AF65-F5344CB8AC3E}">
+        <p14:creationId xmlns:p14="http://schemas.microsoft.com/office/powerpoint/2010/main" val="153749824"/>
       </p:ext>
     </p:extLst>
   </p:cSld>
@@ -8535,6 +9393,467 @@
 </p:sld>
 </file>
 
+<file path=ppt/slides/slide30.xml><?xml version="1.0" encoding="utf-8"?>
+<p:sld xmlns:a="http://schemas.openxmlformats.org/drawingml/2006/main" xmlns:r="http://schemas.openxmlformats.org/officeDocument/2006/relationships" xmlns:p="http://schemas.openxmlformats.org/presentationml/2006/main">
+  <p:cSld>
+    <p:spTree>
+      <p:nvGrpSpPr>
+        <p:cNvPr id="1" name=""/>
+        <p:cNvGrpSpPr/>
+        <p:nvPr/>
+      </p:nvGrpSpPr>
+      <p:grpSpPr>
+        <a:xfrm>
+          <a:off x="0" y="0"/>
+          <a:ext cx="0" cy="0"/>
+          <a:chOff x="0" y="0"/>
+          <a:chExt cx="0" cy="0"/>
+        </a:xfrm>
+      </p:grpSpPr>
+      <p:sp>
+        <p:nvSpPr>
+          <p:cNvPr id="2" name="Title 1"/>
+          <p:cNvSpPr>
+            <a:spLocks noGrp="1"/>
+          </p:cNvSpPr>
+          <p:nvPr>
+            <p:ph type="title"/>
+          </p:nvPr>
+        </p:nvSpPr>
+        <p:spPr/>
+        <p:txBody>
+          <a:bodyPr/>
+          <a:lstStyle/>
+          <a:p>
+            <a:r>
+              <a:rPr lang="en-US" dirty="0" smtClean="0"/>
+              <a:t>Cautionary tale in </a:t>
+            </a:r>
+            <a:r>
+              <a:rPr lang="en-US" dirty="0" err="1" smtClean="0"/>
+              <a:t>barplots</a:t>
+            </a:r>
+            <a:endParaRPr lang="en-US" dirty="0"/>
+          </a:p>
+        </p:txBody>
+      </p:sp>
+      <p:pic>
+        <p:nvPicPr>
+          <p:cNvPr id="4" name="Content Placeholder 3"/>
+          <p:cNvPicPr>
+            <a:picLocks noGrp="1" noChangeAspect="1"/>
+          </p:cNvPicPr>
+          <p:nvPr>
+            <p:ph idx="1"/>
+          </p:nvPr>
+        </p:nvPicPr>
+        <p:blipFill rotWithShape="1">
+          <a:blip r:embed="rId2">
+            <a:extLst>
+              <a:ext uri="{28A0092B-C50C-407E-A947-70E740481C1C}">
+                <a14:useLocalDpi xmlns:a14="http://schemas.microsoft.com/office/drawing/2010/main" val="0"/>
+              </a:ext>
+            </a:extLst>
+          </a:blip>
+          <a:srcRect b="31573"/>
+          <a:stretch/>
+        </p:blipFill>
+        <p:spPr>
+          <a:xfrm>
+            <a:off x="1550818" y="2325667"/>
+            <a:ext cx="9151323" cy="3501927"/>
+          </a:xfrm>
+        </p:spPr>
+      </p:pic>
+      <p:sp>
+        <p:nvSpPr>
+          <p:cNvPr id="5" name="TextBox 4"/>
+          <p:cNvSpPr txBox="1"/>
+          <p:nvPr/>
+        </p:nvSpPr>
+        <p:spPr>
+          <a:xfrm>
+            <a:off x="8639033" y="5827594"/>
+            <a:ext cx="2516647" cy="923330"/>
+          </a:xfrm>
+          <a:prstGeom prst="rect">
+            <a:avLst/>
+          </a:prstGeom>
+          <a:noFill/>
+        </p:spPr>
+        <p:txBody>
+          <a:bodyPr wrap="square" rtlCol="0">
+            <a:spAutoFit/>
+          </a:bodyPr>
+          <a:lstStyle/>
+          <a:p>
+            <a:r>
+              <a:rPr lang="en-US" altLang="x-none" sz="1200" dirty="0">
+                <a:hlinkClick r:id="rId3"/>
+              </a:rPr>
+              <a:t>http://journals.plos.org/plosbiology/article?id=10.1371/journal.pbio.1002128</a:t>
+            </a:r>
+            <a:endParaRPr lang="en-US" altLang="x-none" sz="1200" dirty="0"/>
+          </a:p>
+          <a:p>
+            <a:endParaRPr lang="en-US" dirty="0"/>
+          </a:p>
+        </p:txBody>
+      </p:sp>
+    </p:spTree>
+    <p:extLst>
+      <p:ext uri="{BB962C8B-B14F-4D97-AF65-F5344CB8AC3E}">
+        <p14:creationId xmlns:p14="http://schemas.microsoft.com/office/powerpoint/2010/main" val="2004622342"/>
+      </p:ext>
+    </p:extLst>
+  </p:cSld>
+  <p:clrMapOvr>
+    <a:masterClrMapping/>
+  </p:clrMapOvr>
+</p:sld>
+</file>
+
+<file path=ppt/slides/slide31.xml><?xml version="1.0" encoding="utf-8"?>
+<p:sld xmlns:a="http://schemas.openxmlformats.org/drawingml/2006/main" xmlns:r="http://schemas.openxmlformats.org/officeDocument/2006/relationships" xmlns:p="http://schemas.openxmlformats.org/presentationml/2006/main">
+  <p:cSld>
+    <p:spTree>
+      <p:nvGrpSpPr>
+        <p:cNvPr id="1" name=""/>
+        <p:cNvGrpSpPr/>
+        <p:nvPr/>
+      </p:nvGrpSpPr>
+      <p:grpSpPr>
+        <a:xfrm>
+          <a:off x="0" y="0"/>
+          <a:ext cx="0" cy="0"/>
+          <a:chOff x="0" y="0"/>
+          <a:chExt cx="0" cy="0"/>
+        </a:xfrm>
+      </p:grpSpPr>
+      <p:sp>
+        <p:nvSpPr>
+          <p:cNvPr id="2" name="Title 1"/>
+          <p:cNvSpPr>
+            <a:spLocks noGrp="1"/>
+          </p:cNvSpPr>
+          <p:nvPr>
+            <p:ph type="title"/>
+          </p:nvPr>
+        </p:nvSpPr>
+        <p:spPr/>
+        <p:txBody>
+          <a:bodyPr/>
+          <a:lstStyle/>
+          <a:p>
+            <a:r>
+              <a:rPr lang="en-US" dirty="0" smtClean="0"/>
+              <a:t>Scatterplot</a:t>
+            </a:r>
+            <a:endParaRPr lang="en-US" dirty="0"/>
+          </a:p>
+        </p:txBody>
+      </p:sp>
+      <p:pic>
+        <p:nvPicPr>
+          <p:cNvPr id="4" name="Content Placeholder 3"/>
+          <p:cNvPicPr>
+            <a:picLocks noGrp="1" noChangeAspect="1"/>
+          </p:cNvPicPr>
+          <p:nvPr>
+            <p:ph idx="1"/>
+          </p:nvPr>
+        </p:nvPicPr>
+        <p:blipFill>
+          <a:blip r:embed="rId2">
+            <a:extLst>
+              <a:ext uri="{28A0092B-C50C-407E-A947-70E740481C1C}">
+                <a14:useLocalDpi xmlns:a14="http://schemas.microsoft.com/office/drawing/2010/main" val="0"/>
+              </a:ext>
+            </a:extLst>
+          </a:blip>
+          <a:stretch>
+            <a:fillRect/>
+          </a:stretch>
+        </p:blipFill>
+        <p:spPr>
+          <a:xfrm>
+            <a:off x="6708372" y="2019935"/>
+            <a:ext cx="4813300" cy="3670300"/>
+          </a:xfrm>
+        </p:spPr>
+      </p:pic>
+      <p:pic>
+        <p:nvPicPr>
+          <p:cNvPr id="5" name="Picture 4"/>
+          <p:cNvPicPr>
+            <a:picLocks noChangeAspect="1"/>
+          </p:cNvPicPr>
+          <p:nvPr/>
+        </p:nvPicPr>
+        <p:blipFill>
+          <a:blip r:embed="rId3">
+            <a:extLst>
+              <a:ext uri="{28A0092B-C50C-407E-A947-70E740481C1C}">
+                <a14:useLocalDpi xmlns:a14="http://schemas.microsoft.com/office/drawing/2010/main" val="0"/>
+              </a:ext>
+            </a:extLst>
+          </a:blip>
+          <a:stretch>
+            <a:fillRect/>
+          </a:stretch>
+        </p:blipFill>
+        <p:spPr>
+          <a:xfrm>
+            <a:off x="737358" y="2019935"/>
+            <a:ext cx="4813300" cy="3670300"/>
+          </a:xfrm>
+          <a:prstGeom prst="rect">
+            <a:avLst/>
+          </a:prstGeom>
+        </p:spPr>
+      </p:pic>
+      <p:sp>
+        <p:nvSpPr>
+          <p:cNvPr id="6" name="Rectangle 5"/>
+          <p:cNvSpPr/>
+          <p:nvPr/>
+        </p:nvSpPr>
+        <p:spPr>
+          <a:xfrm>
+            <a:off x="8802806" y="5390866"/>
+            <a:ext cx="1037230" cy="299369"/>
+          </a:xfrm>
+          <a:prstGeom prst="rect">
+            <a:avLst/>
+          </a:prstGeom>
+          <a:noFill/>
+          <a:ln w="38100">
+            <a:solidFill>
+              <a:srgbClr val="FF0000"/>
+            </a:solidFill>
+          </a:ln>
+        </p:spPr>
+        <p:style>
+          <a:lnRef idx="2">
+            <a:schemeClr val="accent1">
+              <a:shade val="50000"/>
+            </a:schemeClr>
+          </a:lnRef>
+          <a:fillRef idx="1">
+            <a:schemeClr val="accent1"/>
+          </a:fillRef>
+          <a:effectRef idx="0">
+            <a:schemeClr val="accent1"/>
+          </a:effectRef>
+          <a:fontRef idx="minor">
+            <a:schemeClr val="lt1"/>
+          </a:fontRef>
+        </p:style>
+        <p:txBody>
+          <a:bodyPr rtlCol="0" anchor="ctr"/>
+          <a:lstStyle/>
+          <a:p>
+            <a:pPr algn="ctr"/>
+            <a:endParaRPr lang="en-US"/>
+          </a:p>
+        </p:txBody>
+      </p:sp>
+      <p:sp>
+        <p:nvSpPr>
+          <p:cNvPr id="7" name="Rectangle 6"/>
+          <p:cNvSpPr/>
+          <p:nvPr/>
+        </p:nvSpPr>
+        <p:spPr>
+          <a:xfrm>
+            <a:off x="6708372" y="2975213"/>
+            <a:ext cx="384412" cy="1311578"/>
+          </a:xfrm>
+          <a:prstGeom prst="rect">
+            <a:avLst/>
+          </a:prstGeom>
+          <a:noFill/>
+          <a:ln w="38100">
+            <a:solidFill>
+              <a:srgbClr val="FF0000"/>
+            </a:solidFill>
+          </a:ln>
+        </p:spPr>
+        <p:style>
+          <a:lnRef idx="2">
+            <a:schemeClr val="accent1">
+              <a:shade val="50000"/>
+            </a:schemeClr>
+          </a:lnRef>
+          <a:fillRef idx="1">
+            <a:schemeClr val="accent1"/>
+          </a:fillRef>
+          <a:effectRef idx="0">
+            <a:schemeClr val="accent1"/>
+          </a:effectRef>
+          <a:fontRef idx="minor">
+            <a:schemeClr val="lt1"/>
+          </a:fontRef>
+        </p:style>
+        <p:txBody>
+          <a:bodyPr rtlCol="0" anchor="ctr"/>
+          <a:lstStyle/>
+          <a:p>
+            <a:pPr algn="ctr"/>
+            <a:endParaRPr lang="en-US"/>
+          </a:p>
+        </p:txBody>
+      </p:sp>
+      <p:sp>
+        <p:nvSpPr>
+          <p:cNvPr id="8" name="TextBox 7"/>
+          <p:cNvSpPr txBox="1"/>
+          <p:nvPr/>
+        </p:nvSpPr>
+        <p:spPr>
+          <a:xfrm>
+            <a:off x="8052179" y="5757366"/>
+            <a:ext cx="3575714" cy="369332"/>
+          </a:xfrm>
+          <a:prstGeom prst="rect">
+            <a:avLst/>
+          </a:prstGeom>
+          <a:noFill/>
+        </p:spPr>
+        <p:txBody>
+          <a:bodyPr wrap="square" rtlCol="0">
+            <a:spAutoFit/>
+          </a:bodyPr>
+          <a:lstStyle/>
+          <a:p>
+            <a:r>
+              <a:rPr lang="en-US" b="1" dirty="0" smtClean="0">
+                <a:solidFill>
+                  <a:srgbClr val="FF0000"/>
+                </a:solidFill>
+              </a:rPr>
+              <a:t>explanatory/independent variable</a:t>
+            </a:r>
+            <a:endParaRPr lang="en-US" b="1" dirty="0">
+              <a:solidFill>
+                <a:srgbClr val="FF0000"/>
+              </a:solidFill>
+            </a:endParaRPr>
+          </a:p>
+        </p:txBody>
+      </p:sp>
+      <p:sp>
+        <p:nvSpPr>
+          <p:cNvPr id="10" name="TextBox 9"/>
+          <p:cNvSpPr txBox="1"/>
+          <p:nvPr/>
+        </p:nvSpPr>
+        <p:spPr>
+          <a:xfrm>
+            <a:off x="5112721" y="2387650"/>
+            <a:ext cx="3575714" cy="369332"/>
+          </a:xfrm>
+          <a:prstGeom prst="rect">
+            <a:avLst/>
+          </a:prstGeom>
+          <a:noFill/>
+        </p:spPr>
+        <p:txBody>
+          <a:bodyPr wrap="square" rtlCol="0">
+            <a:spAutoFit/>
+          </a:bodyPr>
+          <a:lstStyle/>
+          <a:p>
+            <a:r>
+              <a:rPr lang="en-US" b="1" dirty="0" smtClean="0">
+                <a:solidFill>
+                  <a:srgbClr val="FF0000"/>
+                </a:solidFill>
+              </a:rPr>
+              <a:t>response/dependent variable</a:t>
+            </a:r>
+            <a:endParaRPr lang="en-US" b="1" dirty="0">
+              <a:solidFill>
+                <a:srgbClr val="FF0000"/>
+              </a:solidFill>
+            </a:endParaRPr>
+          </a:p>
+        </p:txBody>
+      </p:sp>
+    </p:spTree>
+    <p:extLst>
+      <p:ext uri="{BB962C8B-B14F-4D97-AF65-F5344CB8AC3E}">
+        <p14:creationId xmlns:p14="http://schemas.microsoft.com/office/powerpoint/2010/main" val="1052954970"/>
+      </p:ext>
+    </p:extLst>
+  </p:cSld>
+  <p:clrMapOvr>
+    <a:masterClrMapping/>
+  </p:clrMapOvr>
+</p:sld>
+</file>
+
+<file path=ppt/slides/slide32.xml><?xml version="1.0" encoding="utf-8"?>
+<p:sld xmlns:a="http://schemas.openxmlformats.org/drawingml/2006/main" xmlns:r="http://schemas.openxmlformats.org/officeDocument/2006/relationships" xmlns:p="http://schemas.openxmlformats.org/presentationml/2006/main">
+  <p:cSld>
+    <p:spTree>
+      <p:nvGrpSpPr>
+        <p:cNvPr id="1" name=""/>
+        <p:cNvGrpSpPr/>
+        <p:nvPr/>
+      </p:nvGrpSpPr>
+      <p:grpSpPr>
+        <a:xfrm>
+          <a:off x="0" y="0"/>
+          <a:ext cx="0" cy="0"/>
+          <a:chOff x="0" y="0"/>
+          <a:chExt cx="0" cy="0"/>
+        </a:xfrm>
+      </p:grpSpPr>
+      <p:sp>
+        <p:nvSpPr>
+          <p:cNvPr id="2" name="Title 1"/>
+          <p:cNvSpPr>
+            <a:spLocks noGrp="1"/>
+          </p:cNvSpPr>
+          <p:nvPr>
+            <p:ph type="title"/>
+          </p:nvPr>
+        </p:nvSpPr>
+        <p:spPr>
+          <a:xfrm>
+            <a:off x="4304504" y="354843"/>
+            <a:ext cx="3502016" cy="1282890"/>
+          </a:xfrm>
+        </p:spPr>
+        <p:txBody>
+          <a:bodyPr>
+            <a:normAutofit fontScale="90000"/>
+          </a:bodyPr>
+          <a:lstStyle/>
+          <a:p>
+            <a:pPr algn="ctr"/>
+            <a:r>
+              <a:rPr lang="en-US" sz="10000" b="1" dirty="0" smtClean="0"/>
+              <a:t>BREAK</a:t>
+            </a:r>
+            <a:endParaRPr lang="en-US" sz="10000" b="1" dirty="0"/>
+          </a:p>
+        </p:txBody>
+      </p:sp>
+    </p:spTree>
+    <p:extLst>
+      <p:ext uri="{BB962C8B-B14F-4D97-AF65-F5344CB8AC3E}">
+        <p14:creationId xmlns:p14="http://schemas.microsoft.com/office/powerpoint/2010/main" val="898484646"/>
+      </p:ext>
+    </p:extLst>
+  </p:cSld>
+  <p:clrMapOvr>
+    <a:masterClrMapping/>
+  </p:clrMapOvr>
+</p:sld>
+</file>
+
 <file path=ppt/slides/slide4.xml><?xml version="1.0" encoding="utf-8"?>
 <p:sld xmlns:a="http://schemas.openxmlformats.org/drawingml/2006/main" xmlns:r="http://schemas.openxmlformats.org/officeDocument/2006/relationships" xmlns:p="http://schemas.openxmlformats.org/presentationml/2006/main">
   <p:cSld>
@@ -8610,15 +9929,7 @@
           <a:p>
             <a:r>
               <a:rPr lang="en-US" dirty="0" smtClean="0"/>
-              <a:t>Fundamentals in </a:t>
-            </a:r>
-            <a:r>
-              <a:rPr lang="en-US" dirty="0" smtClean="0"/>
-              <a:t>probability, </a:t>
-            </a:r>
-            <a:r>
-              <a:rPr lang="en-US" dirty="0" smtClean="0"/>
-              <a:t>distributions</a:t>
+              <a:t>Fundamentals in probability, distributions</a:t>
             </a:r>
           </a:p>
           <a:p>
@@ -8626,7 +9937,6 @@
               <a:rPr lang="en-US" dirty="0" smtClean="0"/>
               <a:t>Statistical inference: hypothesis testing and confidence intervals</a:t>
             </a:r>
-            <a:endParaRPr lang="en-US" dirty="0" smtClean="0"/>
           </a:p>
           <a:p>
             <a:r>
@@ -8763,11 +10073,7 @@
           <a:p>
             <a:r>
               <a:rPr lang="en-US" dirty="0" smtClean="0"/>
-              <a:t>Linear </a:t>
-            </a:r>
-            <a:r>
-              <a:rPr lang="en-US" dirty="0" smtClean="0"/>
-              <a:t>modeling</a:t>
+              <a:t>Linear modeling</a:t>
             </a:r>
           </a:p>
           <a:p>

</xml_diff>

<commit_message>
lineplot and joyplot to intro
</commit_message>
<xml_diff>
--- a/slides/intro.pptx
+++ b/slides/intro.pptx
@@ -5,7 +5,7 @@
     <p:sldMasterId id="2147484003" r:id="rId1"/>
   </p:sldMasterIdLst>
   <p:notesMasterIdLst>
-    <p:notesMasterId r:id="rId34"/>
+    <p:notesMasterId r:id="rId35"/>
   </p:notesMasterIdLst>
   <p:sldIdLst>
     <p:sldId id="256" r:id="rId2"/>
@@ -39,7 +39,8 @@
     <p:sldId id="293" r:id="rId30"/>
     <p:sldId id="295" r:id="rId31"/>
     <p:sldId id="294" r:id="rId32"/>
-    <p:sldId id="296" r:id="rId33"/>
+    <p:sldId id="297" r:id="rId33"/>
+    <p:sldId id="296" r:id="rId34"/>
   </p:sldIdLst>
   <p:sldSz cx="12192000" cy="6858000"/>
   <p:notesSz cx="6858000" cy="9144000"/>
@@ -228,7 +229,7 @@
           <a:p>
             <a:fld id="{CF39A833-E765-7D41-96DE-4BE65F7DBB91}" type="datetimeFigureOut">
               <a:rPr lang="en-US" smtClean="0"/>
-              <a:t>8/21/17</a:t>
+              <a:t>8/25/17</a:t>
             </a:fld>
             <a:endParaRPr lang="en-US"/>
           </a:p>
@@ -998,7 +999,7 @@
           <a:p>
             <a:fld id="{4BDF68E2-58F2-4D09-BE8B-E3BD06533059}" type="datetimeFigureOut">
               <a:rPr lang="en-US" smtClean="0"/>
-              <a:t>8/21/17</a:t>
+              <a:t>8/25/17</a:t>
             </a:fld>
             <a:endParaRPr lang="en-US" dirty="0"/>
           </a:p>
@@ -1201,7 +1202,7 @@
           <a:p>
             <a:fld id="{2E2D6473-DF6D-4702-B328-E0DD40540A4E}" type="datetimeFigureOut">
               <a:rPr lang="en-US" smtClean="0"/>
-              <a:t>8/21/17</a:t>
+              <a:t>8/25/17</a:t>
             </a:fld>
             <a:endParaRPr lang="en-US" dirty="0"/>
           </a:p>
@@ -1452,7 +1453,7 @@
           <a:p>
             <a:fld id="{E26F7E3A-B166-407D-9866-32884E7D5B37}" type="datetimeFigureOut">
               <a:rPr lang="en-US" smtClean="0"/>
-              <a:t>8/21/17</a:t>
+              <a:t>8/25/17</a:t>
             </a:fld>
             <a:endParaRPr lang="en-US" dirty="0"/>
           </a:p>
@@ -1651,7 +1652,7 @@
           <a:p>
             <a:fld id="{528FC5F6-F338-4AE4-BB23-26385BCFC423}" type="datetimeFigureOut">
               <a:rPr lang="en-US" smtClean="0"/>
-              <a:t>8/21/17</a:t>
+              <a:t>8/25/17</a:t>
             </a:fld>
             <a:endParaRPr lang="en-US" dirty="0"/>
           </a:p>
@@ -1989,7 +1990,7 @@
           <a:p>
             <a:fld id="{20EBB0C4-6273-4C6E-B9BD-2EDC30F1CD52}" type="datetimeFigureOut">
               <a:rPr lang="en-US" smtClean="0"/>
-              <a:t>8/21/17</a:t>
+              <a:t>8/25/17</a:t>
             </a:fld>
             <a:endParaRPr lang="en-US" dirty="0"/>
           </a:p>
@@ -2259,7 +2260,7 @@
           <a:p>
             <a:fld id="{19AB4D41-86C1-4908-B66A-0B50CEB3BF29}" type="datetimeFigureOut">
               <a:rPr lang="en-US" smtClean="0"/>
-              <a:t>8/21/17</a:t>
+              <a:t>8/25/17</a:t>
             </a:fld>
             <a:endParaRPr lang="en-US" dirty="0"/>
           </a:p>
@@ -2633,7 +2634,7 @@
           <a:p>
             <a:fld id="{E6426E2C-56C1-4E0D-A793-0088A7FDD37E}" type="datetimeFigureOut">
               <a:rPr lang="en-US" smtClean="0"/>
-              <a:t>8/21/17</a:t>
+              <a:t>8/25/17</a:t>
             </a:fld>
             <a:endParaRPr lang="en-US" dirty="0"/>
           </a:p>
@@ -2746,7 +2747,7 @@
           <a:p>
             <a:fld id="{C8C39B41-D8B5-4052-B551-9B5525EAA8B6}" type="datetimeFigureOut">
               <a:rPr lang="en-US" smtClean="0"/>
-              <a:t>8/21/17</a:t>
+              <a:t>8/25/17</a:t>
             </a:fld>
             <a:endParaRPr lang="en-US" dirty="0"/>
           </a:p>
@@ -2912,7 +2913,7 @@
           <a:p>
             <a:fld id="{4D94136C-8742-45B2-AF27-D93DF72833A9}" type="datetimeFigureOut">
               <a:rPr lang="en-US" smtClean="0"/>
-              <a:t>8/21/17</a:t>
+              <a:t>8/25/17</a:t>
             </a:fld>
             <a:endParaRPr lang="en-US" dirty="0"/>
           </a:p>
@@ -3262,7 +3263,7 @@
           <a:p>
             <a:fld id="{32ABBEA6-7C60-4B02-AE87-00D78D8422AF}" type="datetimeFigureOut">
               <a:rPr lang="en-US" smtClean="0"/>
-              <a:t>8/21/17</a:t>
+              <a:t>8/25/17</a:t>
             </a:fld>
             <a:endParaRPr lang="en-US" dirty="0"/>
           </a:p>
@@ -3635,7 +3636,7 @@
           <a:p>
             <a:fld id="{C9CAD897-D46E-4AD2-BD9B-49DD3E640873}" type="datetimeFigureOut">
               <a:rPr lang="en-US" smtClean="0"/>
-              <a:t>8/21/17</a:t>
+              <a:t>8/25/17</a:t>
             </a:fld>
             <a:endParaRPr lang="en-US" dirty="0"/>
           </a:p>
@@ -3917,7 +3918,7 @@
           <a:p>
             <a:fld id="{98624D31-43A5-475A-80CF-332C9F6DCF35}" type="datetimeFigureOut">
               <a:rPr lang="en-US" smtClean="0"/>
-              <a:t>8/21/17</a:t>
+              <a:t>8/25/17</a:t>
             </a:fld>
             <a:endParaRPr lang="en-US" dirty="0"/>
           </a:p>
@@ -7552,7 +7553,23 @@
           <a:p>
             <a:r>
               <a:rPr lang="en-US" dirty="0" smtClean="0"/>
-              <a:t>Median and IQR are much more robust to outliers/extremes compared to mean and </a:t>
+              <a:t>Median and IQR are much more </a:t>
+            </a:r>
+            <a:r>
+              <a:rPr lang="en-US" b="1" dirty="0" smtClean="0"/>
+              <a:t>robust to </a:t>
+            </a:r>
+            <a:r>
+              <a:rPr lang="en-US" b="1" smtClean="0"/>
+              <a:t>outliers/extremes </a:t>
+            </a:r>
+            <a:r>
+              <a:rPr lang="en-US" smtClean="0"/>
+              <a:t>than mean </a:t>
+            </a:r>
+            <a:r>
+              <a:rPr lang="en-US" dirty="0" smtClean="0"/>
+              <a:t>and </a:t>
             </a:r>
             <a:r>
               <a:rPr lang="en-US" dirty="0" err="1" smtClean="0"/>
@@ -9794,6 +9811,118 @@
 </file>
 
 <file path=ppt/slides/slide32.xml><?xml version="1.0" encoding="utf-8"?>
+<p:sld xmlns:a="http://schemas.openxmlformats.org/drawingml/2006/main" xmlns:r="http://schemas.openxmlformats.org/officeDocument/2006/relationships" xmlns:p="http://schemas.openxmlformats.org/presentationml/2006/main">
+  <p:cSld>
+    <p:spTree>
+      <p:nvGrpSpPr>
+        <p:cNvPr id="1" name=""/>
+        <p:cNvGrpSpPr/>
+        <p:nvPr/>
+      </p:nvGrpSpPr>
+      <p:grpSpPr>
+        <a:xfrm>
+          <a:off x="0" y="0"/>
+          <a:ext cx="0" cy="0"/>
+          <a:chOff x="0" y="0"/>
+          <a:chExt cx="0" cy="0"/>
+        </a:xfrm>
+      </p:grpSpPr>
+      <p:sp>
+        <p:nvSpPr>
+          <p:cNvPr id="2" name="Title 1"/>
+          <p:cNvSpPr>
+            <a:spLocks noGrp="1"/>
+          </p:cNvSpPr>
+          <p:nvPr>
+            <p:ph type="title"/>
+          </p:nvPr>
+        </p:nvSpPr>
+        <p:spPr/>
+        <p:txBody>
+          <a:bodyPr/>
+          <a:lstStyle/>
+          <a:p>
+            <a:r>
+              <a:rPr lang="en-US" dirty="0" smtClean="0"/>
+              <a:t>Time series data</a:t>
+            </a:r>
+            <a:endParaRPr lang="en-US" dirty="0"/>
+          </a:p>
+        </p:txBody>
+      </p:sp>
+      <p:pic>
+        <p:nvPicPr>
+          <p:cNvPr id="4" name="Content Placeholder 3"/>
+          <p:cNvPicPr>
+            <a:picLocks noGrp="1" noChangeAspect="1"/>
+          </p:cNvPicPr>
+          <p:nvPr>
+            <p:ph idx="1"/>
+          </p:nvPr>
+        </p:nvPicPr>
+        <p:blipFill>
+          <a:blip r:embed="rId2">
+            <a:extLst>
+              <a:ext uri="{28A0092B-C50C-407E-A947-70E740481C1C}">
+                <a14:useLocalDpi xmlns:a14="http://schemas.microsoft.com/office/drawing/2010/main" val="0"/>
+              </a:ext>
+            </a:extLst>
+          </a:blip>
+          <a:stretch>
+            <a:fillRect/>
+          </a:stretch>
+        </p:blipFill>
+        <p:spPr>
+          <a:xfrm>
+            <a:off x="764109" y="3046815"/>
+            <a:ext cx="7301061" cy="2262164"/>
+          </a:xfrm>
+        </p:spPr>
+      </p:pic>
+      <p:pic>
+        <p:nvPicPr>
+          <p:cNvPr id="5" name="Content Placeholder 3"/>
+          <p:cNvPicPr>
+            <a:picLocks noChangeAspect="1"/>
+          </p:cNvPicPr>
+          <p:nvPr/>
+        </p:nvPicPr>
+        <p:blipFill>
+          <a:blip r:embed="rId3">
+            <a:extLst>
+              <a:ext uri="{28A0092B-C50C-407E-A947-70E740481C1C}">
+                <a14:useLocalDpi xmlns:a14="http://schemas.microsoft.com/office/drawing/2010/main" val="0"/>
+              </a:ext>
+            </a:extLst>
+          </a:blip>
+          <a:stretch>
+            <a:fillRect/>
+          </a:stretch>
+        </p:blipFill>
+        <p:spPr>
+          <a:xfrm>
+            <a:off x="8065170" y="1900854"/>
+            <a:ext cx="3760113" cy="4022725"/>
+          </a:xfrm>
+          <a:prstGeom prst="rect">
+            <a:avLst/>
+          </a:prstGeom>
+        </p:spPr>
+      </p:pic>
+    </p:spTree>
+    <p:extLst>
+      <p:ext uri="{BB962C8B-B14F-4D97-AF65-F5344CB8AC3E}">
+        <p14:creationId xmlns:p14="http://schemas.microsoft.com/office/powerpoint/2010/main" val="807729099"/>
+      </p:ext>
+    </p:extLst>
+  </p:cSld>
+  <p:clrMapOvr>
+    <a:masterClrMapping/>
+  </p:clrMapOvr>
+</p:sld>
+</file>
+
+<file path=ppt/slides/slide33.xml><?xml version="1.0" encoding="utf-8"?>
 <p:sld xmlns:a="http://schemas.openxmlformats.org/drawingml/2006/main" xmlns:r="http://schemas.openxmlformats.org/officeDocument/2006/relationships" xmlns:p="http://schemas.openxmlformats.org/presentationml/2006/main">
   <p:cSld>
     <p:spTree>

</xml_diff>